<commit_message>
insercao do endereco do github
</commit_message>
<xml_diff>
--- a/continuous integration.pptx
+++ b/continuous integration.pptx
@@ -5836,7 +5836,7 @@
         </p:blipFill>
         <p:spPr>
           <a:xfrm>
-            <a:off x="2771800" y="1988840"/>
+            <a:off x="2771800" y="916136"/>
             <a:ext cx="3911447" cy="2944912"/>
           </a:xfrm>
           <a:prstGeom prst="rect">
@@ -5844,6 +5844,78 @@
           </a:prstGeom>
         </p:spPr>
       </p:pic>
+      <p:sp>
+        <p:nvSpPr>
+          <p:cNvPr id="3" name="CaixaDeTexto 2"/>
+          <p:cNvSpPr txBox="1"/>
+          <p:nvPr/>
+        </p:nvSpPr>
+        <p:spPr>
+          <a:xfrm>
+            <a:off x="1907704" y="4509120"/>
+            <a:ext cx="5472608" cy="1477328"/>
+          </a:xfrm>
+          <a:prstGeom prst="rect">
+            <a:avLst/>
+          </a:prstGeom>
+          <a:noFill/>
+        </p:spPr>
+        <p:txBody>
+          <a:bodyPr wrap="square" rtlCol="0">
+            <a:spAutoFit/>
+          </a:bodyPr>
+          <a:lstStyle/>
+          <a:p>
+            <a:pPr algn="ctr"/>
+            <a:r>
+              <a:rPr lang="pt-BR" dirty="0" smtClean="0"/>
+              <a:t>Gostou da apresentação ?</a:t>
+            </a:r>
+          </a:p>
+          <a:p>
+            <a:endParaRPr lang="pt-BR" dirty="0" smtClean="0"/>
+          </a:p>
+          <a:p>
+            <a:r>
+              <a:rPr lang="pt-BR" dirty="0" smtClean="0"/>
+              <a:t>Pega lá</a:t>
+            </a:r>
+          </a:p>
+          <a:p>
+            <a:pPr algn="ctr"/>
+            <a:r>
+              <a:rPr lang="pt-BR" dirty="0" err="1" smtClean="0">
+                <a:solidFill>
+                  <a:schemeClr val="bg1">
+                    <a:lumMod val="50000"/>
+                  </a:schemeClr>
+                </a:solidFill>
+              </a:rPr>
+              <a:t>git</a:t>
+            </a:r>
+            <a:r>
+              <a:rPr lang="pt-BR" dirty="0" smtClean="0">
+                <a:solidFill>
+                  <a:schemeClr val="bg1">
+                    <a:lumMod val="50000"/>
+                  </a:schemeClr>
+                </a:solidFill>
+              </a:rPr>
+              <a:t> clone https://github.com/ggodas/CI-jenkins.git</a:t>
+            </a:r>
+            <a:endParaRPr lang="pt-BR" dirty="0" smtClean="0">
+              <a:solidFill>
+                <a:schemeClr val="bg1">
+                  <a:lumMod val="50000"/>
+                </a:schemeClr>
+              </a:solidFill>
+            </a:endParaRPr>
+          </a:p>
+          <a:p>
+            <a:endParaRPr lang="pt-BR" dirty="0"/>
+          </a:p>
+        </p:txBody>
+      </p:sp>
     </p:spTree>
   </p:cSld>
   <p:clrMapOvr>

</xml_diff>